<commit_message>
Crit bonus changed slightly
+1 damage when phys, special effect otherwise
</commit_message>
<xml_diff>
--- a/Characters/Basics/20P - Stormtrooper.pptx
+++ b/Characters/Basics/20P - Stormtrooper.pptx
@@ -243,7 +243,7 @@
           <a:p>
             <a:fld id="{0B4D85F4-ACAB-4D02-9EB8-5027950E88E8}" type="datetimeFigureOut">
               <a:rPr lang="de-AT" smtClean="0"/>
-              <a:t>23.11.2016</a:t>
+              <a:t>28.11.2016</a:t>
             </a:fld>
             <a:endParaRPr lang="de-AT"/>
           </a:p>
@@ -413,7 +413,7 @@
           <a:p>
             <a:fld id="{0B4D85F4-ACAB-4D02-9EB8-5027950E88E8}" type="datetimeFigureOut">
               <a:rPr lang="de-AT" smtClean="0"/>
-              <a:t>23.11.2016</a:t>
+              <a:t>28.11.2016</a:t>
             </a:fld>
             <a:endParaRPr lang="de-AT"/>
           </a:p>
@@ -593,7 +593,7 @@
           <a:p>
             <a:fld id="{0B4D85F4-ACAB-4D02-9EB8-5027950E88E8}" type="datetimeFigureOut">
               <a:rPr lang="de-AT" smtClean="0"/>
-              <a:t>23.11.2016</a:t>
+              <a:t>28.11.2016</a:t>
             </a:fld>
             <a:endParaRPr lang="de-AT"/>
           </a:p>
@@ -763,7 +763,7 @@
           <a:p>
             <a:fld id="{0B4D85F4-ACAB-4D02-9EB8-5027950E88E8}" type="datetimeFigureOut">
               <a:rPr lang="de-AT" smtClean="0"/>
-              <a:t>23.11.2016</a:t>
+              <a:t>28.11.2016</a:t>
             </a:fld>
             <a:endParaRPr lang="de-AT"/>
           </a:p>
@@ -1007,7 +1007,7 @@
           <a:p>
             <a:fld id="{0B4D85F4-ACAB-4D02-9EB8-5027950E88E8}" type="datetimeFigureOut">
               <a:rPr lang="de-AT" smtClean="0"/>
-              <a:t>23.11.2016</a:t>
+              <a:t>28.11.2016</a:t>
             </a:fld>
             <a:endParaRPr lang="de-AT"/>
           </a:p>
@@ -1239,7 +1239,7 @@
           <a:p>
             <a:fld id="{0B4D85F4-ACAB-4D02-9EB8-5027950E88E8}" type="datetimeFigureOut">
               <a:rPr lang="de-AT" smtClean="0"/>
-              <a:t>23.11.2016</a:t>
+              <a:t>28.11.2016</a:t>
             </a:fld>
             <a:endParaRPr lang="de-AT"/>
           </a:p>
@@ -1606,7 +1606,7 @@
           <a:p>
             <a:fld id="{0B4D85F4-ACAB-4D02-9EB8-5027950E88E8}" type="datetimeFigureOut">
               <a:rPr lang="de-AT" smtClean="0"/>
-              <a:t>23.11.2016</a:t>
+              <a:t>28.11.2016</a:t>
             </a:fld>
             <a:endParaRPr lang="de-AT"/>
           </a:p>
@@ -1724,7 +1724,7 @@
           <a:p>
             <a:fld id="{0B4D85F4-ACAB-4D02-9EB8-5027950E88E8}" type="datetimeFigureOut">
               <a:rPr lang="de-AT" smtClean="0"/>
-              <a:t>23.11.2016</a:t>
+              <a:t>28.11.2016</a:t>
             </a:fld>
             <a:endParaRPr lang="de-AT"/>
           </a:p>
@@ -1819,7 +1819,7 @@
           <a:p>
             <a:fld id="{0B4D85F4-ACAB-4D02-9EB8-5027950E88E8}" type="datetimeFigureOut">
               <a:rPr lang="de-AT" smtClean="0"/>
-              <a:t>23.11.2016</a:t>
+              <a:t>28.11.2016</a:t>
             </a:fld>
             <a:endParaRPr lang="de-AT"/>
           </a:p>
@@ -2096,7 +2096,7 @@
           <a:p>
             <a:fld id="{0B4D85F4-ACAB-4D02-9EB8-5027950E88E8}" type="datetimeFigureOut">
               <a:rPr lang="de-AT" smtClean="0"/>
-              <a:t>23.11.2016</a:t>
+              <a:t>28.11.2016</a:t>
             </a:fld>
             <a:endParaRPr lang="de-AT"/>
           </a:p>
@@ -2353,7 +2353,7 @@
           <a:p>
             <a:fld id="{0B4D85F4-ACAB-4D02-9EB8-5027950E88E8}" type="datetimeFigureOut">
               <a:rPr lang="de-AT" smtClean="0"/>
-              <a:t>23.11.2016</a:t>
+              <a:t>28.11.2016</a:t>
             </a:fld>
             <a:endParaRPr lang="de-AT"/>
           </a:p>
@@ -2566,7 +2566,7 @@
           <a:p>
             <a:fld id="{0B4D85F4-ACAB-4D02-9EB8-5027950E88E8}" type="datetimeFigureOut">
               <a:rPr lang="de-AT" smtClean="0"/>
-              <a:t>23.11.2016</a:t>
+              <a:t>28.11.2016</a:t>
             </a:fld>
             <a:endParaRPr lang="de-AT"/>
           </a:p>
@@ -6575,6 +6575,35 @@
                 </a:solidFill>
                 <a:latin typeface="Corbel" panose="020B0503020204020204" pitchFamily="34" charset="0"/>
               </a:rPr>
+              <a:t>+1 Aim </a:t>
+            </a:r>
+            <a:r>
+              <a:rPr lang="en-US" sz="800">
+                <a:solidFill>
+                  <a:schemeClr val="tx1"/>
+                </a:solidFill>
+                <a:latin typeface="Corbel" panose="020B0503020204020204" pitchFamily="34" charset="0"/>
+              </a:rPr>
+              <a:t>from </a:t>
+            </a:r>
+            <a:r>
+              <a:rPr lang="en-US" sz="800" i="1">
+                <a:solidFill>
+                  <a:schemeClr val="tx1"/>
+                </a:solidFill>
+                <a:latin typeface="Corbel" panose="020B0503020204020204" pitchFamily="34" charset="0"/>
+              </a:rPr>
+              <a:t>Veteran</a:t>
+            </a:r>
+          </a:p>
+          <a:p>
+            <a:r>
+              <a:rPr lang="en-US" sz="800" dirty="0">
+                <a:solidFill>
+                  <a:schemeClr val="tx1"/>
+                </a:solidFill>
+                <a:latin typeface="Corbel" panose="020B0503020204020204" pitchFamily="34" charset="0"/>
+              </a:rPr>
               <a:t>Bolter with </a:t>
             </a:r>
             <a:r>

</xml_diff>